<commit_message>
changes to intro and basics
</commit_message>
<xml_diff>
--- a/docs/_static/Bearbeitete Bilder aus classEx.pptx
+++ b/docs/_static/Bearbeitete Bilder aus classEx.pptx
@@ -293,7 +293,7 @@
           <a:p>
             <a:fld id="{E6DC7167-61E9-449F-B13C-3C2862044923}" type="datetimeFigureOut">
               <a:rPr lang="de-DE" smtClean="0"/>
-              <a:t>05.09.2018</a:t>
+              <a:t>12.10.2018</a:t>
             </a:fld>
             <a:endParaRPr lang="de-DE"/>
           </a:p>
@@ -463,7 +463,7 @@
           <a:p>
             <a:fld id="{E6DC7167-61E9-449F-B13C-3C2862044923}" type="datetimeFigureOut">
               <a:rPr lang="de-DE" smtClean="0"/>
-              <a:t>05.09.2018</a:t>
+              <a:t>12.10.2018</a:t>
             </a:fld>
             <a:endParaRPr lang="de-DE"/>
           </a:p>
@@ -643,7 +643,7 @@
           <a:p>
             <a:fld id="{E6DC7167-61E9-449F-B13C-3C2862044923}" type="datetimeFigureOut">
               <a:rPr lang="de-DE" smtClean="0"/>
-              <a:t>05.09.2018</a:t>
+              <a:t>12.10.2018</a:t>
             </a:fld>
             <a:endParaRPr lang="de-DE"/>
           </a:p>
@@ -813,7 +813,7 @@
           <a:p>
             <a:fld id="{E6DC7167-61E9-449F-B13C-3C2862044923}" type="datetimeFigureOut">
               <a:rPr lang="de-DE" smtClean="0"/>
-              <a:t>05.09.2018</a:t>
+              <a:t>12.10.2018</a:t>
             </a:fld>
             <a:endParaRPr lang="de-DE"/>
           </a:p>
@@ -1059,7 +1059,7 @@
           <a:p>
             <a:fld id="{E6DC7167-61E9-449F-B13C-3C2862044923}" type="datetimeFigureOut">
               <a:rPr lang="de-DE" smtClean="0"/>
-              <a:t>05.09.2018</a:t>
+              <a:t>12.10.2018</a:t>
             </a:fld>
             <a:endParaRPr lang="de-DE"/>
           </a:p>
@@ -1347,7 +1347,7 @@
           <a:p>
             <a:fld id="{E6DC7167-61E9-449F-B13C-3C2862044923}" type="datetimeFigureOut">
               <a:rPr lang="de-DE" smtClean="0"/>
-              <a:t>05.09.2018</a:t>
+              <a:t>12.10.2018</a:t>
             </a:fld>
             <a:endParaRPr lang="de-DE"/>
           </a:p>
@@ -1769,7 +1769,7 @@
           <a:p>
             <a:fld id="{E6DC7167-61E9-449F-B13C-3C2862044923}" type="datetimeFigureOut">
               <a:rPr lang="de-DE" smtClean="0"/>
-              <a:t>05.09.2018</a:t>
+              <a:t>12.10.2018</a:t>
             </a:fld>
             <a:endParaRPr lang="de-DE"/>
           </a:p>
@@ -1887,7 +1887,7 @@
           <a:p>
             <a:fld id="{E6DC7167-61E9-449F-B13C-3C2862044923}" type="datetimeFigureOut">
               <a:rPr lang="de-DE" smtClean="0"/>
-              <a:t>05.09.2018</a:t>
+              <a:t>12.10.2018</a:t>
             </a:fld>
             <a:endParaRPr lang="de-DE"/>
           </a:p>
@@ -1982,7 +1982,7 @@
           <a:p>
             <a:fld id="{E6DC7167-61E9-449F-B13C-3C2862044923}" type="datetimeFigureOut">
               <a:rPr lang="de-DE" smtClean="0"/>
-              <a:t>05.09.2018</a:t>
+              <a:t>12.10.2018</a:t>
             </a:fld>
             <a:endParaRPr lang="de-DE"/>
           </a:p>
@@ -2259,7 +2259,7 @@
           <a:p>
             <a:fld id="{E6DC7167-61E9-449F-B13C-3C2862044923}" type="datetimeFigureOut">
               <a:rPr lang="de-DE" smtClean="0"/>
-              <a:t>05.09.2018</a:t>
+              <a:t>12.10.2018</a:t>
             </a:fld>
             <a:endParaRPr lang="de-DE"/>
           </a:p>
@@ -2512,7 +2512,7 @@
           <a:p>
             <a:fld id="{E6DC7167-61E9-449F-B13C-3C2862044923}" type="datetimeFigureOut">
               <a:rPr lang="de-DE" smtClean="0"/>
-              <a:t>05.09.2018</a:t>
+              <a:t>12.10.2018</a:t>
             </a:fld>
             <a:endParaRPr lang="de-DE"/>
           </a:p>
@@ -2725,7 +2725,7 @@
           <a:p>
             <a:fld id="{E6DC7167-61E9-449F-B13C-3C2862044923}" type="datetimeFigureOut">
               <a:rPr lang="de-DE" smtClean="0"/>
-              <a:t>05.09.2018</a:t>
+              <a:t>12.10.2018</a:t>
             </a:fld>
             <a:endParaRPr lang="de-DE"/>
           </a:p>
@@ -3102,7 +3102,7 @@
       </p:grpSpPr>
       <p:pic>
         <p:nvPicPr>
-          <p:cNvPr id="1026" name="Picture 2" descr="File:Loginnew.JPG"/>
+          <p:cNvPr id="2" name="Picture 2"/>
           <p:cNvPicPr>
             <a:picLocks noChangeAspect="1" noChangeArrowheads="1"/>
           </p:cNvPicPr>
@@ -3123,220 +3123,47 @@
         </p:blipFill>
         <p:spPr bwMode="auto">
           <a:xfrm>
-            <a:off x="1377896" y="1859111"/>
-            <a:ext cx="4371975" cy="2457451"/>
+            <a:off x="1972945" y="2003511"/>
+            <a:ext cx="4273550" cy="2800350"/>
           </a:xfrm>
           <a:prstGeom prst="rect">
             <a:avLst/>
           </a:prstGeom>
           <a:noFill/>
+          <a:ln>
+            <a:noFill/>
+          </a:ln>
           <a:extLst>
             <a:ext uri="{909E8E84-426E-40DD-AFC4-6F175D3DCCD1}">
               <a14:hiddenFill xmlns:a14="http://schemas.microsoft.com/office/drawing/2010/main">
                 <a:solidFill>
-                  <a:srgbClr val="FFFFFF"/>
+                  <a:schemeClr val="accent1"/>
                 </a:solidFill>
               </a14:hiddenFill>
             </a:ext>
+            <a:ext uri="{91240B29-F687-4F45-9708-019B960494DF}">
+              <a14:hiddenLine xmlns:a14="http://schemas.microsoft.com/office/drawing/2010/main" w="9525">
+                <a:solidFill>
+                  <a:schemeClr val="tx1"/>
+                </a:solidFill>
+                <a:miter lim="800000"/>
+                <a:headEnd/>
+                <a:tailEnd/>
+              </a14:hiddenLine>
+            </a:ext>
           </a:extLst>
         </p:spPr>
       </p:pic>
-      <p:sp>
-        <p:nvSpPr>
-          <p:cNvPr id="4" name="Rechteck 3"/>
-          <p:cNvSpPr/>
-          <p:nvPr/>
-        </p:nvSpPr>
-        <p:spPr>
-          <a:xfrm>
-            <a:off x="2123727" y="2890839"/>
-            <a:ext cx="2843561" cy="206523"/>
-          </a:xfrm>
-          <a:prstGeom prst="rect">
-            <a:avLst/>
-          </a:prstGeom>
-          <a:noFill/>
-          <a:ln w="19050">
-            <a:solidFill>
-              <a:srgbClr val="FF0000"/>
-            </a:solidFill>
-          </a:ln>
-        </p:spPr>
-        <p:style>
-          <a:lnRef idx="2">
-            <a:schemeClr val="accent1">
-              <a:shade val="50000"/>
-            </a:schemeClr>
-          </a:lnRef>
-          <a:fillRef idx="1">
-            <a:schemeClr val="accent1"/>
-          </a:fillRef>
-          <a:effectRef idx="0">
-            <a:schemeClr val="accent1"/>
-          </a:effectRef>
-          <a:fontRef idx="minor">
-            <a:schemeClr val="lt1"/>
-          </a:fontRef>
-        </p:style>
-        <p:txBody>
-          <a:bodyPr rtlCol="0" anchor="ctr"/>
-          <a:lstStyle/>
-          <a:p>
-            <a:pPr algn="ctr"/>
-            <a:endParaRPr lang="de-DE"/>
-          </a:p>
-        </p:txBody>
-      </p:sp>
-      <p:sp>
-        <p:nvSpPr>
-          <p:cNvPr id="9" name="Rechteck 8"/>
-          <p:cNvSpPr/>
-          <p:nvPr/>
-        </p:nvSpPr>
-        <p:spPr>
-          <a:xfrm>
-            <a:off x="2123711" y="3095632"/>
-            <a:ext cx="2843561" cy="206523"/>
-          </a:xfrm>
-          <a:prstGeom prst="rect">
-            <a:avLst/>
-          </a:prstGeom>
-          <a:noFill/>
-          <a:ln w="19050">
-            <a:solidFill>
-              <a:srgbClr val="FF0000"/>
-            </a:solidFill>
-          </a:ln>
-        </p:spPr>
-        <p:style>
-          <a:lnRef idx="2">
-            <a:schemeClr val="accent1">
-              <a:shade val="50000"/>
-            </a:schemeClr>
-          </a:lnRef>
-          <a:fillRef idx="1">
-            <a:schemeClr val="accent1"/>
-          </a:fillRef>
-          <a:effectRef idx="0">
-            <a:schemeClr val="accent1"/>
-          </a:effectRef>
-          <a:fontRef idx="minor">
-            <a:schemeClr val="lt1"/>
-          </a:fontRef>
-        </p:style>
-        <p:txBody>
-          <a:bodyPr rtlCol="0" anchor="ctr"/>
-          <a:lstStyle/>
-          <a:p>
-            <a:pPr algn="ctr"/>
-            <a:endParaRPr lang="de-DE"/>
-          </a:p>
-        </p:txBody>
-      </p:sp>
-      <p:sp>
-        <p:nvSpPr>
-          <p:cNvPr id="10" name="Rechteck 9"/>
-          <p:cNvSpPr/>
-          <p:nvPr/>
-        </p:nvSpPr>
-        <p:spPr>
-          <a:xfrm>
-            <a:off x="2123695" y="3300425"/>
-            <a:ext cx="2843561" cy="206523"/>
-          </a:xfrm>
-          <a:prstGeom prst="rect">
-            <a:avLst/>
-          </a:prstGeom>
-          <a:noFill/>
-          <a:ln w="19050">
-            <a:solidFill>
-              <a:srgbClr val="FF0000"/>
-            </a:solidFill>
-          </a:ln>
-        </p:spPr>
-        <p:style>
-          <a:lnRef idx="2">
-            <a:schemeClr val="accent1">
-              <a:shade val="50000"/>
-            </a:schemeClr>
-          </a:lnRef>
-          <a:fillRef idx="1">
-            <a:schemeClr val="accent1"/>
-          </a:fillRef>
-          <a:effectRef idx="0">
-            <a:schemeClr val="accent1"/>
-          </a:effectRef>
-          <a:fontRef idx="minor">
-            <a:schemeClr val="lt1"/>
-          </a:fontRef>
-        </p:style>
-        <p:txBody>
-          <a:bodyPr rtlCol="0" anchor="ctr"/>
-          <a:lstStyle/>
-          <a:p>
-            <a:pPr algn="ctr"/>
-            <a:endParaRPr lang="de-DE"/>
-          </a:p>
-        </p:txBody>
-      </p:sp>
-      <p:sp>
-        <p:nvSpPr>
-          <p:cNvPr id="11" name="Rechteck 10"/>
-          <p:cNvSpPr/>
-          <p:nvPr/>
-        </p:nvSpPr>
-        <p:spPr>
-          <a:xfrm>
-            <a:off x="2123693" y="3632512"/>
-            <a:ext cx="2843561" cy="206523"/>
-          </a:xfrm>
-          <a:prstGeom prst="rect">
-            <a:avLst/>
-          </a:prstGeom>
-          <a:noFill/>
-          <a:ln w="19050">
-            <a:solidFill>
-              <a:srgbClr val="FF0000"/>
-            </a:solidFill>
-          </a:ln>
-        </p:spPr>
-        <p:style>
-          <a:lnRef idx="2">
-            <a:schemeClr val="accent1">
-              <a:shade val="50000"/>
-            </a:schemeClr>
-          </a:lnRef>
-          <a:fillRef idx="1">
-            <a:schemeClr val="accent1"/>
-          </a:fillRef>
-          <a:effectRef idx="0">
-            <a:schemeClr val="accent1"/>
-          </a:effectRef>
-          <a:fontRef idx="minor">
-            <a:schemeClr val="lt1"/>
-          </a:fontRef>
-        </p:style>
-        <p:txBody>
-          <a:bodyPr rtlCol="0" anchor="ctr"/>
-          <a:lstStyle/>
-          <a:p>
-            <a:pPr algn="ctr"/>
-            <a:endParaRPr lang="de-DE"/>
-          </a:p>
-        </p:txBody>
-      </p:sp>
       <p:cxnSp>
         <p:nvCxnSpPr>
           <p:cNvPr id="12" name="Gerade Verbindung 11"/>
-          <p:cNvCxnSpPr>
-            <a:stCxn id="4" idx="3"/>
-          </p:cNvCxnSpPr>
+          <p:cNvCxnSpPr/>
           <p:nvPr/>
         </p:nvCxnSpPr>
         <p:spPr>
           <a:xfrm flipV="1">
-            <a:off x="4967288" y="2333625"/>
-            <a:ext cx="1023937" cy="660476"/>
+            <a:off x="4967288" y="2518291"/>
+            <a:ext cx="1408112" cy="475810"/>
           </a:xfrm>
           <a:prstGeom prst="line">
             <a:avLst/>
@@ -3370,8 +3197,8 @@
         </p:nvCxnSpPr>
         <p:spPr>
           <a:xfrm flipV="1">
-            <a:off x="4967252" y="2647955"/>
-            <a:ext cx="1023937" cy="550938"/>
+            <a:off x="5606220" y="3251200"/>
+            <a:ext cx="1023937" cy="192468"/>
           </a:xfrm>
           <a:prstGeom prst="line">
             <a:avLst/>
@@ -3405,8 +3232,8 @@
         </p:nvCxnSpPr>
         <p:spPr>
           <a:xfrm flipV="1">
-            <a:off x="4967288" y="2923424"/>
-            <a:ext cx="1023902" cy="480269"/>
+            <a:off x="5222558" y="3698240"/>
+            <a:ext cx="1330642" cy="109476"/>
           </a:xfrm>
           <a:prstGeom prst="line">
             <a:avLst/>
@@ -3432,43 +3259,6 @@
           </a:fontRef>
         </p:style>
       </p:cxnSp>
-      <p:cxnSp>
-        <p:nvCxnSpPr>
-          <p:cNvPr id="16" name="Gerade Verbindung 15"/>
-          <p:cNvCxnSpPr>
-            <a:endCxn id="22" idx="1"/>
-          </p:cNvCxnSpPr>
-          <p:nvPr/>
-        </p:nvCxnSpPr>
-        <p:spPr>
-          <a:xfrm flipV="1">
-            <a:off x="4967253" y="3230837"/>
-            <a:ext cx="1023972" cy="518995"/>
-          </a:xfrm>
-          <a:prstGeom prst="line">
-            <a:avLst/>
-          </a:prstGeom>
-          <a:ln w="12700">
-            <a:solidFill>
-              <a:srgbClr val="FF0000"/>
-            </a:solidFill>
-          </a:ln>
-        </p:spPr>
-        <p:style>
-          <a:lnRef idx="1">
-            <a:schemeClr val="accent1"/>
-          </a:lnRef>
-          <a:fillRef idx="0">
-            <a:schemeClr val="accent1"/>
-          </a:fillRef>
-          <a:effectRef idx="0">
-            <a:schemeClr val="accent1"/>
-          </a:effectRef>
-          <a:fontRef idx="minor">
-            <a:schemeClr val="tx1"/>
-          </a:fontRef>
-        </p:style>
-      </p:cxnSp>
       <p:sp>
         <p:nvSpPr>
           <p:cNvPr id="18" name="Textfeld 17"/>
@@ -3477,7 +3267,7 @@
         </p:nvSpPr>
         <p:spPr>
           <a:xfrm>
-            <a:off x="5991225" y="2148959"/>
+            <a:off x="6433185" y="2326574"/>
             <a:ext cx="1443037" cy="369332"/>
           </a:xfrm>
           <a:prstGeom prst="rect">
@@ -3500,7 +3290,7 @@
                   <a:srgbClr val="FF0000"/>
                 </a:solidFill>
               </a:rPr>
-              <a:t>University</a:t>
+              <a:t>Institution</a:t>
             </a:r>
             <a:endParaRPr lang="de-DE" dirty="0">
               <a:solidFill>
@@ -3518,7 +3308,7 @@
         </p:nvSpPr>
         <p:spPr>
           <a:xfrm>
-            <a:off x="5991225" y="2453763"/>
+            <a:off x="6642735" y="3106814"/>
             <a:ext cx="1443037" cy="369332"/>
           </a:xfrm>
           <a:prstGeom prst="rect">
@@ -3559,7 +3349,7 @@
         </p:nvSpPr>
         <p:spPr>
           <a:xfrm>
-            <a:off x="5991225" y="2738758"/>
+            <a:off x="6642735" y="3512112"/>
             <a:ext cx="1443037" cy="369332"/>
           </a:xfrm>
           <a:prstGeom prst="rect">
@@ -3585,53 +3375,12 @@
               <a:t>User </a:t>
             </a:r>
             <a:r>
-              <a:rPr lang="de-DE" dirty="0" err="1" smtClean="0">
+              <a:rPr lang="de-DE" dirty="0" smtClean="0">
                 <a:solidFill>
                   <a:srgbClr val="FF0000"/>
                 </a:solidFill>
               </a:rPr>
-              <a:t>mode</a:t>
-            </a:r>
-            <a:endParaRPr lang="de-DE" dirty="0">
-              <a:solidFill>
-                <a:srgbClr val="FF0000"/>
-              </a:solidFill>
-            </a:endParaRPr>
-          </a:p>
-        </p:txBody>
-      </p:sp>
-      <p:sp>
-        <p:nvSpPr>
-          <p:cNvPr id="22" name="Textfeld 21"/>
-          <p:cNvSpPr txBox="1"/>
-          <p:nvPr/>
-        </p:nvSpPr>
-        <p:spPr>
-          <a:xfrm>
-            <a:off x="5991225" y="3046171"/>
-            <a:ext cx="1443037" cy="369332"/>
-          </a:xfrm>
-          <a:prstGeom prst="rect">
-            <a:avLst/>
-          </a:prstGeom>
-          <a:noFill/>
-          <a:ln>
-            <a:noFill/>
-          </a:ln>
-        </p:spPr>
-        <p:txBody>
-          <a:bodyPr wrap="square" rtlCol="0">
-            <a:spAutoFit/>
-          </a:bodyPr>
-          <a:lstStyle/>
-          <a:p>
-            <a:r>
-              <a:rPr lang="de-DE" dirty="0" smtClean="0">
-                <a:solidFill>
-                  <a:srgbClr val="FF0000"/>
-                </a:solidFill>
-              </a:rPr>
-              <a:t>Password</a:t>
+              <a:t>type</a:t>
             </a:r>
             <a:endParaRPr lang="de-DE" dirty="0">
               <a:solidFill>

</xml_diff>